<commit_message>
commit - Final commit from pc gefco
</commit_message>
<xml_diff>
--- a/___VALEO/src/notebooks/valeo_20200701_1.pptx
+++ b/___VALEO/src/notebooks/valeo_20200701_1.pptx
@@ -6,10 +6,10 @@
     <p:sldMasterId id="2147483660" r:id="rId2"/>
   </p:sldMasterIdLst>
   <p:notesMasterIdLst>
-    <p:notesMasterId r:id="rId28"/>
+    <p:notesMasterId r:id="rId29"/>
   </p:notesMasterIdLst>
   <p:handoutMasterIdLst>
-    <p:handoutMasterId r:id="rId29"/>
+    <p:handoutMasterId r:id="rId30"/>
   </p:handoutMasterIdLst>
   <p:sldIdLst>
     <p:sldId id="256" r:id="rId3"/>
@@ -37,6 +37,7 @@
     <p:sldId id="279" r:id="rId25"/>
     <p:sldId id="280" r:id="rId26"/>
     <p:sldId id="281" r:id="rId27"/>
+    <p:sldId id="282" r:id="rId28"/>
   </p:sldIdLst>
   <p:sldSz cx="12192000" cy="6858000"/>
   <p:notesSz cx="6858000" cy="9144000"/>
@@ -135,6 +136,14 @@
       </a:defRPr>
     </a:lvl9pPr>
   </p:defaultTextStyle>
+  <p:extLst>
+    <p:ext uri="{EFAFB233-063F-42B5-8137-9DF3F51BA10A}">
+      <p15:sldGuideLst xmlns:p15="http://schemas.microsoft.com/office/powerpoint/2012/main"/>
+    </p:ext>
+    <p:ext uri="{2D200454-40CA-4A62-9FC3-DE9A4176ACB9}">
+      <p15:notesGuideLst xmlns:p15="http://schemas.microsoft.com/office/powerpoint/2012/main"/>
+    </p:ext>
+  </p:extLst>
 </p:presentation>
 </file>
 
@@ -232,7 +241,7 @@
           <a:p>
             <a:fld id="{21C67A9F-2247-41A2-A985-4911DAD26DD2}" type="datetimeFigureOut">
               <a:rPr lang="fr-FR" smtClean="0"/>
-              <a:t>02/07/2020</a:t>
+              <a:t>04/07/2020</a:t>
             </a:fld>
             <a:endParaRPr lang="fr-FR"/>
           </a:p>
@@ -410,7 +419,7 @@
           <a:p>
             <a:fld id="{4FDDEAFB-EE77-4495-8B17-5835EBF32B73}" type="datetimeFigureOut">
               <a:rPr lang="fr-FR" smtClean="0"/>
-              <a:t>01/07/2020</a:t>
+              <a:t>04/07/2020</a:t>
             </a:fld>
             <a:endParaRPr lang="fr-FR"/>
           </a:p>
@@ -2393,7 +2402,7 @@
           <a:p>
             <a:fld id="{A08E0AD1-C09D-4331-BA0F-A6E50155A13A}" type="datetime1">
               <a:rPr lang="fr-FR" smtClean="0"/>
-              <a:t>02/07/2020</a:t>
+              <a:t>04/07/2020</a:t>
             </a:fld>
             <a:endParaRPr lang="fr-FR"/>
           </a:p>
@@ -2591,7 +2600,7 @@
           <a:p>
             <a:fld id="{84C397FE-577A-494A-B1E4-7F802F133EB5}" type="datetime1">
               <a:rPr lang="fr-FR" smtClean="0"/>
-              <a:t>02/07/2020</a:t>
+              <a:t>04/07/2020</a:t>
             </a:fld>
             <a:endParaRPr lang="fr-FR"/>
           </a:p>
@@ -2799,7 +2808,7 @@
           <a:p>
             <a:fld id="{C291495E-B0DC-4FF7-8F6B-9658CB9BD80D}" type="datetime1">
               <a:rPr lang="fr-FR" smtClean="0"/>
-              <a:t>02/07/2020</a:t>
+              <a:t>04/07/2020</a:t>
             </a:fld>
             <a:endParaRPr lang="fr-FR"/>
           </a:p>
@@ -3019,7 +3028,7 @@
           <a:p>
             <a:fld id="{1B563F5A-4982-4F4A-93B0-AA55BBD8EAF0}" type="datetime1">
               <a:rPr lang="fr-FR" smtClean="0"/>
-              <a:t>02/07/2020</a:t>
+              <a:t>04/07/2020</a:t>
             </a:fld>
             <a:endParaRPr lang="fr-FR"/>
           </a:p>
@@ -3160,7 +3169,7 @@
           <a:p>
             <a:fld id="{44735C3A-91D6-4352-AADD-EECCC53E5A4C}" type="datetime1">
               <a:rPr lang="fr-FR" smtClean="0"/>
-              <a:t>02/07/2020</a:t>
+              <a:t>04/07/2020</a:t>
             </a:fld>
             <a:endParaRPr lang="fr-FR"/>
           </a:p>
@@ -3358,7 +3367,7 @@
           <a:p>
             <a:fld id="{22603D2D-77B0-45D3-840C-4004F6269553}" type="datetime1">
               <a:rPr lang="fr-FR" smtClean="0"/>
-              <a:t>02/07/2020</a:t>
+              <a:t>04/07/2020</a:t>
             </a:fld>
             <a:endParaRPr lang="fr-FR"/>
           </a:p>
@@ -3633,7 +3642,7 @@
           <a:p>
             <a:fld id="{A07F1483-7BA0-483C-B15F-E1A5161760D7}" type="datetime1">
               <a:rPr lang="fr-FR" smtClean="0"/>
-              <a:t>02/07/2020</a:t>
+              <a:t>04/07/2020</a:t>
             </a:fld>
             <a:endParaRPr lang="fr-FR"/>
           </a:p>
@@ -3898,7 +3907,7 @@
           <a:p>
             <a:fld id="{BDAED27F-7A65-4D6D-8186-44D754BF98C0}" type="datetime1">
               <a:rPr lang="fr-FR" smtClean="0"/>
-              <a:t>02/07/2020</a:t>
+              <a:t>04/07/2020</a:t>
             </a:fld>
             <a:endParaRPr lang="fr-FR"/>
           </a:p>
@@ -4310,7 +4319,7 @@
           <a:p>
             <a:fld id="{D119CC23-925C-45EA-B27E-3AA7D09F9AFC}" type="datetime1">
               <a:rPr lang="fr-FR" smtClean="0"/>
-              <a:t>02/07/2020</a:t>
+              <a:t>04/07/2020</a:t>
             </a:fld>
             <a:endParaRPr lang="fr-FR"/>
           </a:p>
@@ -4451,7 +4460,7 @@
           <a:p>
             <a:fld id="{173A2108-1C4C-49EE-AB5E-E9E2B22F7F79}" type="datetime1">
               <a:rPr lang="fr-FR" smtClean="0"/>
-              <a:t>02/07/2020</a:t>
+              <a:t>04/07/2020</a:t>
             </a:fld>
             <a:endParaRPr lang="fr-FR"/>
           </a:p>
@@ -4564,7 +4573,7 @@
           <a:p>
             <a:fld id="{BDFBC1E9-891C-471D-AF9D-7CD80EEE6036}" type="datetime1">
               <a:rPr lang="fr-FR" smtClean="0"/>
-              <a:t>02/07/2020</a:t>
+              <a:t>04/07/2020</a:t>
             </a:fld>
             <a:endParaRPr lang="fr-FR"/>
           </a:p>
@@ -4762,7 +4771,7 @@
           <a:p>
             <a:fld id="{3BA858E9-A010-4638-8422-9F0FDBE17CE0}" type="datetime1">
               <a:rPr lang="fr-FR" smtClean="0"/>
-              <a:t>02/07/2020</a:t>
+              <a:t>04/07/2020</a:t>
             </a:fld>
             <a:endParaRPr lang="fr-FR"/>
           </a:p>
@@ -5073,7 +5082,7 @@
           <a:p>
             <a:fld id="{2FC2AFFE-FAC6-41D5-98A1-CDDF5855AB4A}" type="datetime1">
               <a:rPr lang="fr-FR" smtClean="0"/>
-              <a:t>02/07/2020</a:t>
+              <a:t>04/07/2020</a:t>
             </a:fld>
             <a:endParaRPr lang="fr-FR"/>
           </a:p>
@@ -5361,7 +5370,7 @@
           <a:p>
             <a:fld id="{9C42688E-7D54-4F25-8B0E-EF3CD4DF549C}" type="datetime1">
               <a:rPr lang="fr-FR" smtClean="0"/>
-              <a:t>02/07/2020</a:t>
+              <a:t>04/07/2020</a:t>
             </a:fld>
             <a:endParaRPr lang="fr-FR"/>
           </a:p>
@@ -5559,7 +5568,7 @@
           <a:p>
             <a:fld id="{FDC01D52-2010-490B-85A9-0D37EC8E351B}" type="datetime1">
               <a:rPr lang="fr-FR" smtClean="0"/>
-              <a:t>02/07/2020</a:t>
+              <a:t>04/07/2020</a:t>
             </a:fld>
             <a:endParaRPr lang="fr-FR"/>
           </a:p>
@@ -5767,7 +5776,7 @@
           <a:p>
             <a:fld id="{E16AD1DA-C74C-4F93-9D2D-9D01203E704E}" type="datetime1">
               <a:rPr lang="fr-FR" smtClean="0"/>
-              <a:t>02/07/2020</a:t>
+              <a:t>04/07/2020</a:t>
             </a:fld>
             <a:endParaRPr lang="fr-FR"/>
           </a:p>
@@ -6042,7 +6051,7 @@
           <a:p>
             <a:fld id="{71BEDA96-5694-4A64-927A-3C9F74187C3A}" type="datetime1">
               <a:rPr lang="fr-FR" smtClean="0"/>
-              <a:t>02/07/2020</a:t>
+              <a:t>04/07/2020</a:t>
             </a:fld>
             <a:endParaRPr lang="fr-FR"/>
           </a:p>
@@ -6307,7 +6316,7 @@
           <a:p>
             <a:fld id="{F27089AE-9CC8-463E-B8D4-9A003CA04DD4}" type="datetime1">
               <a:rPr lang="fr-FR" smtClean="0"/>
-              <a:t>02/07/2020</a:t>
+              <a:t>04/07/2020</a:t>
             </a:fld>
             <a:endParaRPr lang="fr-FR"/>
           </a:p>
@@ -6719,7 +6728,7 @@
           <a:p>
             <a:fld id="{8ABBAECB-054F-4AFC-B77E-D7AB84A696CB}" type="datetime1">
               <a:rPr lang="fr-FR" smtClean="0"/>
-              <a:t>02/07/2020</a:t>
+              <a:t>04/07/2020</a:t>
             </a:fld>
             <a:endParaRPr lang="fr-FR"/>
           </a:p>
@@ -6860,7 +6869,7 @@
           <a:p>
             <a:fld id="{61296B68-2F06-4B3A-A4CA-1E73F7277B43}" type="datetime1">
               <a:rPr lang="fr-FR" smtClean="0"/>
-              <a:t>02/07/2020</a:t>
+              <a:t>04/07/2020</a:t>
             </a:fld>
             <a:endParaRPr lang="fr-FR"/>
           </a:p>
@@ -6973,7 +6982,7 @@
           <a:p>
             <a:fld id="{97035154-8791-48AA-8C38-04AD52F50440}" type="datetime1">
               <a:rPr lang="fr-FR" smtClean="0"/>
-              <a:t>02/07/2020</a:t>
+              <a:t>04/07/2020</a:t>
             </a:fld>
             <a:endParaRPr lang="fr-FR"/>
           </a:p>
@@ -7284,7 +7293,7 @@
           <a:p>
             <a:fld id="{D67D6271-D5F3-4AB9-9099-187CAA4AF22C}" type="datetime1">
               <a:rPr lang="fr-FR" smtClean="0"/>
-              <a:t>02/07/2020</a:t>
+              <a:t>04/07/2020</a:t>
             </a:fld>
             <a:endParaRPr lang="fr-FR"/>
           </a:p>
@@ -7572,7 +7581,7 @@
           <a:p>
             <a:fld id="{50041B5F-58DB-496A-9C7A-72D694786FF9}" type="datetime1">
               <a:rPr lang="fr-FR" smtClean="0"/>
-              <a:t>02/07/2020</a:t>
+              <a:t>04/07/2020</a:t>
             </a:fld>
             <a:endParaRPr lang="fr-FR"/>
           </a:p>
@@ -7813,7 +7822,7 @@
           <a:p>
             <a:fld id="{9958F91B-88AF-482B-86B1-58A11896D24F}" type="datetime1">
               <a:rPr lang="fr-FR" smtClean="0"/>
-              <a:t>02/07/2020</a:t>
+              <a:t>04/07/2020</a:t>
             </a:fld>
             <a:endParaRPr lang="fr-FR"/>
           </a:p>
@@ -8382,7 +8391,7 @@
           <a:p>
             <a:fld id="{9D840444-080E-4A16-8DBD-20E67FFFB0DF}" type="datetime1">
               <a:rPr lang="fr-FR" smtClean="0"/>
-              <a:t>02/07/2020</a:t>
+              <a:t>04/07/2020</a:t>
             </a:fld>
             <a:endParaRPr lang="fr-FR"/>
           </a:p>
@@ -15178,18 +15187,21 @@
             <p:ph type="title"/>
           </p:nvPr>
         </p:nvSpPr>
-        <p:spPr/>
-        <p:txBody>
-          <a:bodyPr/>
-          <a:lstStyle/>
-          <a:p>
-            <a:r>
-              <a:rPr lang="fr-FR" dirty="0" err="1"/>
-              <a:t>Echantilonnage</a:t>
-            </a:r>
-            <a:r>
-              <a:rPr lang="fr-FR"/>
-              <a:t> </a:t>
+        <p:spPr>
+          <a:xfrm>
+            <a:off x="401053" y="365125"/>
+            <a:ext cx="10952747" cy="623017"/>
+          </a:xfrm>
+        </p:spPr>
+        <p:txBody>
+          <a:bodyPr>
+            <a:noAutofit/>
+          </a:bodyPr>
+          <a:lstStyle/>
+          <a:p>
+            <a:r>
+              <a:rPr lang="fr-FR" sz="4000" dirty="0"/>
+              <a:t>Apprentissage et données</a:t>
             </a:r>
           </a:p>
         </p:txBody>
@@ -15210,37 +15222,185 @@
             <p:ph sz="half" idx="1"/>
           </p:nvPr>
         </p:nvSpPr>
-        <p:spPr/>
-        <p:txBody>
-          <a:bodyPr/>
-          <a:lstStyle/>
-          <a:p>
-            <a:endParaRPr lang="fr-FR"/>
-          </a:p>
-        </p:txBody>
-      </p:sp>
-      <p:sp>
-        <p:nvSpPr>
-          <p:cNvPr id="4" name="Espace réservé du contenu 3">
-            <a:extLst>
-              <a:ext uri="{FF2B5EF4-FFF2-40B4-BE49-F238E27FC236}">
-                <a16:creationId xmlns:a16="http://schemas.microsoft.com/office/drawing/2014/main" id="{A225258A-3222-42D1-B8D6-65A00A3D62F4}"/>
-              </a:ext>
-            </a:extLst>
-          </p:cNvPr>
-          <p:cNvSpPr>
-            <a:spLocks noGrp="1"/>
-          </p:cNvSpPr>
-          <p:nvPr>
-            <p:ph sz="half" idx="2"/>
-          </p:nvPr>
-        </p:nvSpPr>
-        <p:spPr/>
-        <p:txBody>
-          <a:bodyPr/>
-          <a:lstStyle/>
-          <a:p>
-            <a:endParaRPr lang="fr-FR"/>
+        <p:spPr>
+          <a:xfrm>
+            <a:off x="401053" y="1136073"/>
+            <a:ext cx="11112073" cy="5356802"/>
+          </a:xfrm>
+        </p:spPr>
+        <p:txBody>
+          <a:bodyPr>
+            <a:normAutofit fontScale="70000" lnSpcReduction="20000"/>
+          </a:bodyPr>
+          <a:lstStyle/>
+          <a:p>
+            <a:r>
+              <a:rPr lang="fr-FR" dirty="0">
+                <a:latin typeface="+mj-lt"/>
+              </a:rPr>
+              <a:t>La performance d’un système d’apprentissage supervisée dépend du modèle, de l’algorithme et des données qui ont servi à entrainer le modèle. </a:t>
+            </a:r>
+          </a:p>
+          <a:p>
+            <a:r>
+              <a:rPr lang="fr-FR" dirty="0">
+                <a:latin typeface="+mj-lt"/>
+              </a:rPr>
+              <a:t>La préparation des données et leurs représentativité constituent un élément essentiel pour améliorer les performances d’un modèle: Plus les données d’apprentissage sont représentatifs des données à prédire, mieux est la performance. </a:t>
+            </a:r>
+          </a:p>
+          <a:p>
+            <a:r>
+              <a:rPr lang="fr-FR" dirty="0">
+                <a:latin typeface="+mj-lt"/>
+              </a:rPr>
+              <a:t>La préparation des données correspond aux étapes vues dans les slides précédentes:</a:t>
+            </a:r>
+          </a:p>
+          <a:p>
+            <a:pPr lvl="1"/>
+            <a:r>
+              <a:rPr lang="fr-FR" dirty="0">
+                <a:latin typeface="+mj-lt"/>
+              </a:rPr>
+              <a:t>Nettoyage des données: Suppression des erreurs et du bruit, complétion des données manquantes </a:t>
+            </a:r>
+          </a:p>
+          <a:p>
+            <a:pPr lvl="1"/>
+            <a:r>
+              <a:rPr lang="fr-FR" dirty="0">
+                <a:latin typeface="+mj-lt"/>
+              </a:rPr>
+              <a:t>Analyse et exploration des données: Identification des principaux features impactant au plus le résultat (mieux comprendre le métier sous jacent, se rapprocher des experts métiers)</a:t>
+            </a:r>
+          </a:p>
+          <a:p>
+            <a:pPr lvl="1"/>
+            <a:r>
+              <a:rPr lang="fr-FR" dirty="0">
+                <a:latin typeface="+mj-lt"/>
+              </a:rPr>
+              <a:t>L’enrichissement du jeux de données par des données supplémentaires utiles.</a:t>
+            </a:r>
+          </a:p>
+          <a:p>
+            <a:pPr lvl="1"/>
+            <a:r>
+              <a:rPr lang="fr-FR" dirty="0">
+                <a:latin typeface="+mj-lt"/>
+              </a:rPr>
+              <a:t>Oversampling et </a:t>
+            </a:r>
+            <a:r>
+              <a:rPr lang="fr-FR" dirty="0" err="1">
+                <a:latin typeface="+mj-lt"/>
+              </a:rPr>
+              <a:t>undersampling</a:t>
+            </a:r>
+            <a:r>
+              <a:rPr lang="fr-FR" dirty="0">
+                <a:latin typeface="+mj-lt"/>
+              </a:rPr>
+              <a:t> au besoin</a:t>
+            </a:r>
+          </a:p>
+          <a:p>
+            <a:pPr lvl="1"/>
+            <a:r>
+              <a:rPr lang="fr-FR" dirty="0">
+                <a:latin typeface="+mj-lt"/>
+              </a:rPr>
+              <a:t>Suppression éventuelles des features identiques</a:t>
+            </a:r>
+          </a:p>
+          <a:p>
+            <a:pPr lvl="1"/>
+            <a:r>
+              <a:rPr lang="fr-FR" dirty="0">
+                <a:latin typeface="+mj-lt"/>
+              </a:rPr>
+              <a:t>Transformations et normalisations </a:t>
+            </a:r>
+          </a:p>
+          <a:p>
+            <a:r>
+              <a:rPr lang="fr-FR" dirty="0">
+                <a:latin typeface="+mj-lt"/>
+              </a:rPr>
+              <a:t>Un système d’apprentissage supervisée passe par une étape d’entrainement, de validation et de test. </a:t>
+            </a:r>
+          </a:p>
+          <a:p>
+            <a:r>
+              <a:rPr lang="fr-FR" dirty="0">
+                <a:latin typeface="+mj-lt"/>
+              </a:rPr>
+              <a:t>Pour chacune de ces étapes:</a:t>
+            </a:r>
+          </a:p>
+          <a:p>
+            <a:pPr lvl="1"/>
+            <a:r>
+              <a:rPr lang="fr-FR" dirty="0">
+                <a:latin typeface="+mj-lt"/>
+              </a:rPr>
+              <a:t>Il faut que les données soit représentatives des données que le système va traiter en « production » </a:t>
+            </a:r>
+            <a:r>
+              <a:rPr lang="fr-FR" dirty="0"/>
+              <a:t>sinon on risque </a:t>
+            </a:r>
+            <a:r>
+              <a:rPr lang="fr-FR" dirty="0">
+                <a:latin typeface="+mj-lt"/>
+              </a:rPr>
+              <a:t>d'introduire un biais d'échantillonnage .  </a:t>
+            </a:r>
+          </a:p>
+          <a:p>
+            <a:pPr lvl="1"/>
+            <a:r>
+              <a:rPr lang="fr-FR" dirty="0">
+                <a:latin typeface="+mj-lt"/>
+              </a:rPr>
+              <a:t>Il faut que le jeux de données utilisé pour chaque étape soit différent afin d’éviter le « data </a:t>
+            </a:r>
+            <a:r>
+              <a:rPr lang="fr-FR" dirty="0" err="1">
+                <a:latin typeface="+mj-lt"/>
+              </a:rPr>
+              <a:t>leakage</a:t>
+            </a:r>
+            <a:r>
+              <a:rPr lang="fr-FR" dirty="0">
+                <a:latin typeface="+mj-lt"/>
+              </a:rPr>
+              <a:t> ».</a:t>
+            </a:r>
+          </a:p>
+          <a:p>
+            <a:pPr marL="457200" lvl="1" indent="0">
+              <a:buNone/>
+            </a:pPr>
+            <a:r>
+              <a:rPr lang="fr-FR" dirty="0">
+                <a:latin typeface="+mj-lt"/>
+              </a:rPr>
+              <a:t>     Un système qui utilise les même données pour le training et la validation (ou</a:t>
+            </a:r>
+            <a:r>
+              <a:rPr lang="fr-FR">
+                <a:latin typeface="+mj-lt"/>
+              </a:rPr>
+              <a:t>) le test </a:t>
+            </a:r>
+            <a:r>
+              <a:rPr lang="fr-FR" dirty="0">
+                <a:latin typeface="+mj-lt"/>
+              </a:rPr>
+              <a:t>aura du mal à généraliser.</a:t>
+            </a:r>
           </a:p>
         </p:txBody>
       </p:sp>
@@ -15277,6 +15437,238 @@
     <p:extLst>
       <p:ext uri="{BB962C8B-B14F-4D97-AF65-F5344CB8AC3E}">
         <p14:creationId xmlns:p14="http://schemas.microsoft.com/office/powerpoint/2010/main" val="2946680006"/>
+      </p:ext>
+    </p:extLst>
+  </p:cSld>
+  <p:clrMapOvr>
+    <a:masterClrMapping/>
+  </p:clrMapOvr>
+</p:sld>
+</file>
+
+<file path=ppt/slides/slide26.xml><?xml version="1.0" encoding="utf-8"?>
+<p:sld xmlns:a="http://schemas.openxmlformats.org/drawingml/2006/main" xmlns:r="http://schemas.openxmlformats.org/officeDocument/2006/relationships" xmlns:p="http://schemas.openxmlformats.org/presentationml/2006/main">
+  <p:cSld>
+    <p:spTree>
+      <p:nvGrpSpPr>
+        <p:cNvPr id="1" name=""/>
+        <p:cNvGrpSpPr/>
+        <p:nvPr/>
+      </p:nvGrpSpPr>
+      <p:grpSpPr>
+        <a:xfrm>
+          <a:off x="0" y="0"/>
+          <a:ext cx="0" cy="0"/>
+          <a:chOff x="0" y="0"/>
+          <a:chExt cx="0" cy="0"/>
+        </a:xfrm>
+      </p:grpSpPr>
+      <p:sp>
+        <p:nvSpPr>
+          <p:cNvPr id="2" name="Titre 1">
+            <a:extLst>
+              <a:ext uri="{FF2B5EF4-FFF2-40B4-BE49-F238E27FC236}">
+                <a16:creationId xmlns:a16="http://schemas.microsoft.com/office/drawing/2014/main" id="{7CA99FCC-7321-47B7-8C28-0F9D91E5F382}"/>
+              </a:ext>
+            </a:extLst>
+          </p:cNvPr>
+          <p:cNvSpPr>
+            <a:spLocks noGrp="1"/>
+          </p:cNvSpPr>
+          <p:nvPr>
+            <p:ph type="title"/>
+          </p:nvPr>
+        </p:nvSpPr>
+        <p:spPr>
+          <a:xfrm>
+            <a:off x="449179" y="365125"/>
+            <a:ext cx="10904621" cy="623017"/>
+          </a:xfrm>
+        </p:spPr>
+        <p:txBody>
+          <a:bodyPr>
+            <a:noAutofit/>
+          </a:bodyPr>
+          <a:lstStyle/>
+          <a:p>
+            <a:r>
+              <a:rPr lang="fr-FR" sz="4000" dirty="0"/>
+              <a:t>Représentativité et split des données</a:t>
+            </a:r>
+          </a:p>
+        </p:txBody>
+      </p:sp>
+      <p:sp>
+        <p:nvSpPr>
+          <p:cNvPr id="3" name="Espace réservé du contenu 2">
+            <a:extLst>
+              <a:ext uri="{FF2B5EF4-FFF2-40B4-BE49-F238E27FC236}">
+                <a16:creationId xmlns:a16="http://schemas.microsoft.com/office/drawing/2014/main" id="{D87DBF27-77A3-47C9-9838-8734330B4BC2}"/>
+              </a:ext>
+            </a:extLst>
+          </p:cNvPr>
+          <p:cNvSpPr>
+            <a:spLocks noGrp="1"/>
+          </p:cNvSpPr>
+          <p:nvPr>
+            <p:ph sz="half" idx="1"/>
+          </p:nvPr>
+        </p:nvSpPr>
+        <p:spPr>
+          <a:xfrm>
+            <a:off x="336884" y="1136073"/>
+            <a:ext cx="11421979" cy="5040890"/>
+          </a:xfrm>
+        </p:spPr>
+        <p:txBody>
+          <a:bodyPr>
+            <a:normAutofit fontScale="70000" lnSpcReduction="20000"/>
+          </a:bodyPr>
+          <a:lstStyle/>
+          <a:p>
+            <a:r>
+              <a:rPr lang="fr-FR" dirty="0">
+                <a:latin typeface="+mj-lt"/>
+              </a:rPr>
+              <a:t>Un échantillonnage représentatif, appelé aussi échantillonnage stratifié, consiste à :</a:t>
+            </a:r>
+          </a:p>
+          <a:p>
+            <a:pPr lvl="1"/>
+            <a:r>
+              <a:rPr lang="fr-FR" dirty="0">
+                <a:latin typeface="+mj-lt"/>
+              </a:rPr>
+              <a:t>Identifier le critère (la feature) le plus déterminant pour aboutir au résultat</a:t>
+            </a:r>
+          </a:p>
+          <a:p>
+            <a:pPr lvl="1"/>
+            <a:r>
+              <a:rPr lang="fr-FR" dirty="0">
+                <a:latin typeface="+mj-lt"/>
+              </a:rPr>
+              <a:t>Par la suite générer un échantillonnage de manière à ce que les jeux de données Train, Validation et Test aient la même proportion de distribution de ce critère déterminant. </a:t>
+            </a:r>
+          </a:p>
+          <a:p>
+            <a:pPr marL="457200" lvl="1" indent="0">
+              <a:buNone/>
+            </a:pPr>
+            <a:r>
+              <a:rPr lang="fr-FR" dirty="0">
+                <a:latin typeface="+mj-lt"/>
+              </a:rPr>
+              <a:t>La librairie de Scikit Learn fournit des méthodes pour effectuer des échantillonnage stratifiés</a:t>
+            </a:r>
+          </a:p>
+          <a:p>
+            <a:pPr marL="457200" lvl="1" indent="0">
+              <a:buNone/>
+            </a:pPr>
+            <a:endParaRPr lang="fr-FR" dirty="0">
+              <a:latin typeface="+mj-lt"/>
+            </a:endParaRPr>
+          </a:p>
+          <a:p>
+            <a:r>
+              <a:rPr lang="fr-FR" dirty="0">
+                <a:latin typeface="+mj-lt"/>
+              </a:rPr>
+              <a:t>D'habitude le critère déterminant d'un problème est bien connu auprès des experts métier de l'entreprise, donc il faut les intégrer au projet de Data Science le plus tôt pour mieux connaitre les enjeux métiers d'une part et pour préparer l'adoption du projet pour la suite.</a:t>
+            </a:r>
+          </a:p>
+          <a:p>
+            <a:endParaRPr lang="fr-FR" dirty="0">
+              <a:latin typeface="+mj-lt"/>
+            </a:endParaRPr>
+          </a:p>
+          <a:p>
+            <a:r>
+              <a:rPr lang="fr-FR" dirty="0">
+                <a:latin typeface="+mj-lt"/>
+              </a:rPr>
+              <a:t>Dans le cadre de cette étude on ne dispose pas d'expertise métier, le critère de stratification</a:t>
+            </a:r>
+            <a:br>
+              <a:rPr lang="fr-FR" dirty="0">
+                <a:latin typeface="+mj-lt"/>
+              </a:rPr>
+            </a:br>
+            <a:r>
+              <a:rPr lang="fr-FR" dirty="0">
+                <a:latin typeface="+mj-lt"/>
+              </a:rPr>
+              <a:t>choisi est la target. Donc chaque échantillons « train / validation / test » contiendra la même proportion de Classe_0 (classe majoritaire) et de Classe_1 (classe minoritaire). </a:t>
+            </a:r>
+          </a:p>
+          <a:p>
+            <a:r>
+              <a:rPr lang="fr-FR" dirty="0"/>
+              <a:t>Une approche itérative a été suivie dans l’étude. </a:t>
+            </a:r>
+            <a:r>
+              <a:rPr lang="fr-FR"/>
+              <a:t>Plusieurs algorithmes et </a:t>
+            </a:r>
+            <a:r>
+              <a:rPr lang="fr-FR" dirty="0"/>
+              <a:t>modèles ont été essayés.</a:t>
+            </a:r>
+          </a:p>
+          <a:p>
+            <a:r>
+              <a:rPr lang="fr-FR" dirty="0"/>
+              <a:t>Lors de chaque essai, une hypothèse initiale était posée </a:t>
+            </a:r>
+            <a:br>
+              <a:rPr lang="fr-FR" dirty="0"/>
+            </a:br>
+            <a:br>
+              <a:rPr lang="fr-FR" dirty="0"/>
+            </a:br>
+            <a:br>
+              <a:rPr lang="fr-FR" dirty="0"/>
+            </a:br>
+            <a:endParaRPr lang="fr-FR" dirty="0">
+              <a:latin typeface="+mj-lt"/>
+            </a:endParaRPr>
+          </a:p>
+        </p:txBody>
+      </p:sp>
+      <p:sp>
+        <p:nvSpPr>
+          <p:cNvPr id="5" name="Espace réservé du numéro de diapositive 4">
+            <a:extLst>
+              <a:ext uri="{FF2B5EF4-FFF2-40B4-BE49-F238E27FC236}">
+                <a16:creationId xmlns:a16="http://schemas.microsoft.com/office/drawing/2014/main" id="{1C2E20DB-720B-4BBA-8B5A-2DF8E2B45224}"/>
+              </a:ext>
+            </a:extLst>
+          </p:cNvPr>
+          <p:cNvSpPr>
+            <a:spLocks noGrp="1"/>
+          </p:cNvSpPr>
+          <p:nvPr>
+            <p:ph type="sldNum" sz="quarter" idx="12"/>
+          </p:nvPr>
+        </p:nvSpPr>
+        <p:spPr/>
+        <p:txBody>
+          <a:bodyPr/>
+          <a:lstStyle/>
+          <a:p>
+            <a:fld id="{5007E085-261E-4E29-899A-AEA28DAA02ED}" type="slidenum">
+              <a:rPr lang="fr-FR" smtClean="0"/>
+              <a:t>26</a:t>
+            </a:fld>
+            <a:endParaRPr lang="fr-FR"/>
+          </a:p>
+        </p:txBody>
+      </p:sp>
+    </p:spTree>
+    <p:extLst>
+      <p:ext uri="{BB962C8B-B14F-4D97-AF65-F5344CB8AC3E}">
+        <p14:creationId xmlns:p14="http://schemas.microsoft.com/office/powerpoint/2010/main" val="25146491"/>
       </p:ext>
     </p:extLst>
   </p:cSld>

</xml_diff>